<commit_message>
July 2023 MathsJam Shout
</commit_message>
<xml_diff>
--- a/MathsJam.pptx
+++ b/MathsJam.pptx
@@ -123,12 +123,12 @@
   <pc:docChgLst>
     <pc:chgData name="Mariah Birgen" userId="b10ecf27-fcd0-4f69-888c-a706ddbd43c5" providerId="ADAL" clId="{1F14A5C9-F64D-4924-9B4B-8827A8E48F45}"/>
     <pc:docChg chg="custSel modSld">
-      <pc:chgData name="Mariah Birgen" userId="b10ecf27-fcd0-4f69-888c-a706ddbd43c5" providerId="ADAL" clId="{1F14A5C9-F64D-4924-9B4B-8827A8E48F45}" dt="2023-04-11T20:54:15.443" v="8" actId="20577"/>
+      <pc:chgData name="Mariah Birgen" userId="b10ecf27-fcd0-4f69-888c-a706ddbd43c5" providerId="ADAL" clId="{1F14A5C9-F64D-4924-9B4B-8827A8E48F45}" dt="2023-05-21T18:12:26.548" v="14" actId="20577"/>
       <pc:docMkLst>
         <pc:docMk/>
       </pc:docMkLst>
       <pc:sldChg chg="delSp modSp mod">
-        <pc:chgData name="Mariah Birgen" userId="b10ecf27-fcd0-4f69-888c-a706ddbd43c5" providerId="ADAL" clId="{1F14A5C9-F64D-4924-9B4B-8827A8E48F45}" dt="2023-04-11T20:54:15.443" v="8" actId="20577"/>
+        <pc:chgData name="Mariah Birgen" userId="b10ecf27-fcd0-4f69-888c-a706ddbd43c5" providerId="ADAL" clId="{1F14A5C9-F64D-4924-9B4B-8827A8E48F45}" dt="2023-05-21T18:12:26.548" v="14" actId="20577"/>
         <pc:sldMkLst>
           <pc:docMk/>
           <pc:sldMk cId="1749219725" sldId="268"/>
@@ -142,7 +142,7 @@
           </ac:spMkLst>
         </pc:spChg>
         <pc:spChg chg="mod">
-          <ac:chgData name="Mariah Birgen" userId="b10ecf27-fcd0-4f69-888c-a706ddbd43c5" providerId="ADAL" clId="{1F14A5C9-F64D-4924-9B4B-8827A8E48F45}" dt="2023-04-11T20:54:15.443" v="8" actId="20577"/>
+          <ac:chgData name="Mariah Birgen" userId="b10ecf27-fcd0-4f69-888c-a706ddbd43c5" providerId="ADAL" clId="{1F14A5C9-F64D-4924-9B4B-8827A8E48F45}" dt="2023-05-21T18:12:26.548" v="14" actId="20577"/>
           <ac:spMkLst>
             <pc:docMk/>
             <pc:sldMk cId="1749219725" sldId="268"/>
@@ -171,6 +171,30 @@
             <pc:docMk/>
             <pc:sldMk cId="1749219725" sldId="268"/>
             <ac:spMk id="4" creationId="{6407BD81-55AF-887F-2ABC-A5B92B30F59C}"/>
+          </ac:spMkLst>
+        </pc:spChg>
+      </pc:sldChg>
+    </pc:docChg>
+  </pc:docChgLst>
+  <pc:docChgLst>
+    <pc:chgData name="Mariah Birgen" userId="b10ecf27-fcd0-4f69-888c-a706ddbd43c5" providerId="ADAL" clId="{553A39A2-D645-460F-A5D6-4FCBC5538FCC}"/>
+    <pc:docChg chg="modSld">
+      <pc:chgData name="Mariah Birgen" userId="b10ecf27-fcd0-4f69-888c-a706ddbd43c5" providerId="ADAL" clId="{553A39A2-D645-460F-A5D6-4FCBC5538FCC}" dt="2023-06-19T16:54:23.902" v="4" actId="20577"/>
+      <pc:docMkLst>
+        <pc:docMk/>
+      </pc:docMkLst>
+      <pc:sldChg chg="modSp mod">
+        <pc:chgData name="Mariah Birgen" userId="b10ecf27-fcd0-4f69-888c-a706ddbd43c5" providerId="ADAL" clId="{553A39A2-D645-460F-A5D6-4FCBC5538FCC}" dt="2023-06-19T16:54:23.902" v="4" actId="20577"/>
+        <pc:sldMkLst>
+          <pc:docMk/>
+          <pc:sldMk cId="1749219725" sldId="268"/>
+        </pc:sldMkLst>
+        <pc:spChg chg="mod">
+          <ac:chgData name="Mariah Birgen" userId="b10ecf27-fcd0-4f69-888c-a706ddbd43c5" providerId="ADAL" clId="{553A39A2-D645-460F-A5D6-4FCBC5538FCC}" dt="2023-06-19T16:54:23.902" v="4" actId="20577"/>
+          <ac:spMkLst>
+            <pc:docMk/>
+            <pc:sldMk cId="1749219725" sldId="268"/>
+            <ac:spMk id="22" creationId="{6436C1BA-6AC9-D645-BF31-F5E682FD2F19}"/>
           </ac:spMkLst>
         </pc:spChg>
       </pc:sldChg>
@@ -28348,7 +28372,7 @@
             <a:fld id="{D541487B-8511-D440-8421-7E31D83D5558}" type="datetimeFigureOut">
               <a:rPr lang="en-US" smtClean="0"/>
               <a:pPr/>
-              <a:t>4/11/2023</a:t>
+              <a:t>6/19/2023</a:t>
             </a:fld>
             <a:endParaRPr lang="en-US" dirty="0"/>
           </a:p>
@@ -29049,7 +29073,7 @@
             <a:fld id="{D541487B-8511-D440-8421-7E31D83D5558}" type="datetimeFigureOut">
               <a:rPr lang="en-US" smtClean="0"/>
               <a:pPr/>
-              <a:t>4/11/2023</a:t>
+              <a:t>6/19/2023</a:t>
             </a:fld>
             <a:endParaRPr lang="en-US" dirty="0"/>
           </a:p>
@@ -29624,7 +29648,7 @@
           <a:p>
             <a:fld id="{D541487B-8511-D440-8421-7E31D83D5558}" type="datetimeFigureOut">
               <a:rPr lang="en-US" smtClean="0"/>
-              <a:t>4/11/2023</a:t>
+              <a:t>6/19/2023</a:t>
             </a:fld>
             <a:endParaRPr lang="en-US" dirty="0"/>
           </a:p>
@@ -31700,7 +31724,7 @@
           <a:p>
             <a:fld id="{D541487B-8511-D440-8421-7E31D83D5558}" type="datetimeFigureOut">
               <a:rPr lang="en-US" smtClean="0"/>
-              <a:t>4/11/2023</a:t>
+              <a:t>6/19/2023</a:t>
             </a:fld>
             <a:endParaRPr lang="en-US" dirty="0"/>
           </a:p>
@@ -32248,7 +32272,7 @@
             <a:fld id="{435CA60F-FFC1-0F45-8FC4-48465EBE2778}" type="datetimeFigureOut">
               <a:rPr lang="en-US" smtClean="0"/>
               <a:pPr/>
-              <a:t>4/11/2023</a:t>
+              <a:t>6/19/2023</a:t>
             </a:fld>
             <a:endParaRPr lang="en-US" dirty="0"/>
           </a:p>
@@ -32811,7 +32835,7 @@
             <a:fld id="{313121A1-4E39-974B-A232-C4E939022B06}" type="datetimeFigureOut">
               <a:rPr lang="en-US" smtClean="0"/>
               <a:pPr/>
-              <a:t>4/11/2023</a:t>
+              <a:t>6/19/2023</a:t>
             </a:fld>
             <a:endParaRPr lang="en-US" dirty="0"/>
           </a:p>
@@ -33374,7 +33398,7 @@
             <a:fld id="{80038350-B08A-D84E-A34E-DF31257ED6A6}" type="datetimeFigureOut">
               <a:rPr lang="en-US" smtClean="0"/>
               <a:pPr/>
-              <a:t>4/11/2023</a:t>
+              <a:t>6/19/2023</a:t>
             </a:fld>
             <a:endParaRPr lang="en-US" dirty="0"/>
           </a:p>
@@ -34036,7 +34060,7 @@
           <a:p>
             <a:r>
               <a:rPr lang="en-US"/>
-              <a:t>April 17</a:t>
+              <a:t>June  26</a:t>
             </a:r>
             <a:endParaRPr lang="en-US" dirty="0"/>
           </a:p>

</xml_diff>